<commit_message>
Updating repo with newest LSTM code and writing project tex files
</commit_message>
<xml_diff>
--- a/Deliverables/Long Short-Term Memory Networks for Time-Series Predictions.pptx
+++ b/Deliverables/Long Short-Term Memory Networks for Time-Series Predictions.pptx
@@ -268,7 +268,7 @@
           <a:p>
             <a:fld id="{EF4F7255-00A4-4B17-BF16-1FD70803AFAF}" type="datetimeFigureOut">
               <a:rPr lang="en-US" smtClean="0"/>
-              <a:t>2/22/2024</a:t>
+              <a:t>2/29/2024</a:t>
             </a:fld>
             <a:endParaRPr lang="en-US"/>
           </a:p>
@@ -466,7 +466,7 @@
           <a:p>
             <a:fld id="{EF4F7255-00A4-4B17-BF16-1FD70803AFAF}" type="datetimeFigureOut">
               <a:rPr lang="en-US" smtClean="0"/>
-              <a:t>2/22/2024</a:t>
+              <a:t>2/29/2024</a:t>
             </a:fld>
             <a:endParaRPr lang="en-US"/>
           </a:p>
@@ -674,7 +674,7 @@
           <a:p>
             <a:fld id="{EF4F7255-00A4-4B17-BF16-1FD70803AFAF}" type="datetimeFigureOut">
               <a:rPr lang="en-US" smtClean="0"/>
-              <a:t>2/22/2024</a:t>
+              <a:t>2/29/2024</a:t>
             </a:fld>
             <a:endParaRPr lang="en-US"/>
           </a:p>
@@ -872,7 +872,7 @@
           <a:p>
             <a:fld id="{EF4F7255-00A4-4B17-BF16-1FD70803AFAF}" type="datetimeFigureOut">
               <a:rPr lang="en-US" smtClean="0"/>
-              <a:t>2/22/2024</a:t>
+              <a:t>2/29/2024</a:t>
             </a:fld>
             <a:endParaRPr lang="en-US"/>
           </a:p>
@@ -1147,7 +1147,7 @@
           <a:p>
             <a:fld id="{EF4F7255-00A4-4B17-BF16-1FD70803AFAF}" type="datetimeFigureOut">
               <a:rPr lang="en-US" smtClean="0"/>
-              <a:t>2/22/2024</a:t>
+              <a:t>2/29/2024</a:t>
             </a:fld>
             <a:endParaRPr lang="en-US"/>
           </a:p>
@@ -1412,7 +1412,7 @@
           <a:p>
             <a:fld id="{EF4F7255-00A4-4B17-BF16-1FD70803AFAF}" type="datetimeFigureOut">
               <a:rPr lang="en-US" smtClean="0"/>
-              <a:t>2/22/2024</a:t>
+              <a:t>2/29/2024</a:t>
             </a:fld>
             <a:endParaRPr lang="en-US"/>
           </a:p>
@@ -1824,7 +1824,7 @@
           <a:p>
             <a:fld id="{EF4F7255-00A4-4B17-BF16-1FD70803AFAF}" type="datetimeFigureOut">
               <a:rPr lang="en-US" smtClean="0"/>
-              <a:t>2/22/2024</a:t>
+              <a:t>2/29/2024</a:t>
             </a:fld>
             <a:endParaRPr lang="en-US"/>
           </a:p>
@@ -1965,7 +1965,7 @@
           <a:p>
             <a:fld id="{EF4F7255-00A4-4B17-BF16-1FD70803AFAF}" type="datetimeFigureOut">
               <a:rPr lang="en-US" smtClean="0"/>
-              <a:t>2/22/2024</a:t>
+              <a:t>2/29/2024</a:t>
             </a:fld>
             <a:endParaRPr lang="en-US"/>
           </a:p>
@@ -2078,7 +2078,7 @@
           <a:p>
             <a:fld id="{EF4F7255-00A4-4B17-BF16-1FD70803AFAF}" type="datetimeFigureOut">
               <a:rPr lang="en-US" smtClean="0"/>
-              <a:t>2/22/2024</a:t>
+              <a:t>2/29/2024</a:t>
             </a:fld>
             <a:endParaRPr lang="en-US"/>
           </a:p>
@@ -2389,7 +2389,7 @@
           <a:p>
             <a:fld id="{EF4F7255-00A4-4B17-BF16-1FD70803AFAF}" type="datetimeFigureOut">
               <a:rPr lang="en-US" smtClean="0"/>
-              <a:t>2/22/2024</a:t>
+              <a:t>2/29/2024</a:t>
             </a:fld>
             <a:endParaRPr lang="en-US"/>
           </a:p>
@@ -2677,7 +2677,7 @@
           <a:p>
             <a:fld id="{EF4F7255-00A4-4B17-BF16-1FD70803AFAF}" type="datetimeFigureOut">
               <a:rPr lang="en-US" smtClean="0"/>
-              <a:t>2/22/2024</a:t>
+              <a:t>2/29/2024</a:t>
             </a:fld>
             <a:endParaRPr lang="en-US"/>
           </a:p>
@@ -2918,7 +2918,7 @@
           <a:p>
             <a:fld id="{EF4F7255-00A4-4B17-BF16-1FD70803AFAF}" type="datetimeFigureOut">
               <a:rPr lang="en-US" smtClean="0"/>
-              <a:t>2/22/2024</a:t>
+              <a:t>2/29/2024</a:t>
             </a:fld>
             <a:endParaRPr lang="en-US"/>
           </a:p>
@@ -3613,7 +3613,7 @@
           <a:p>
             <a:r>
               <a:rPr lang="en-US" dirty="0"/>
-              <a:t>Time-series data has become one of the most common types of data</a:t>
+              <a:t>Modern advances in tech allow for continuously measured data (or time-series data) to be more readily available in a variety of fields</a:t>
             </a:r>
           </a:p>
           <a:p>
@@ -4627,13 +4627,8 @@
           <a:p>
             <a:r>
               <a:rPr lang="en-US" dirty="0"/>
-              <a:t>Neural Network go </a:t>
-            </a:r>
-            <a:r>
-              <a:rPr lang="en-US" dirty="0" err="1"/>
-              <a:t>brrrrrrr</a:t>
-            </a:r>
-            <a:endParaRPr lang="en-US" dirty="0"/>
+              <a:t>Doesn’t require assumption of functional form that ARIMA models take</a:t>
+            </a:r>
           </a:p>
         </p:txBody>
       </p:sp>

</xml_diff>